<commit_message>
closed form for laplace hypersingular integral on a plane element + associated tests
</commit_message>
<xml_diff>
--- a/docs/laurent_coefficients_computation_strategy.pptx
+++ b/docs/laurent_coefficients_computation_strategy.pptx
@@ -270,7 +270,7 @@
           <a:p>
             <a:fld id="{59020F72-C865-4541-9171-6BAA57104CE4}" type="datetimeFigureOut">
               <a:rPr lang="fr-FR" smtClean="0"/>
-              <a:t>14/10/2025</a:t>
+              <a:t>15/10/2025</a:t>
             </a:fld>
             <a:endParaRPr lang="fr-FR"/>
           </a:p>
@@ -470,7 +470,7 @@
           <a:p>
             <a:fld id="{59020F72-C865-4541-9171-6BAA57104CE4}" type="datetimeFigureOut">
               <a:rPr lang="fr-FR" smtClean="0"/>
-              <a:t>14/10/2025</a:t>
+              <a:t>15/10/2025</a:t>
             </a:fld>
             <a:endParaRPr lang="fr-FR"/>
           </a:p>
@@ -680,7 +680,7 @@
           <a:p>
             <a:fld id="{59020F72-C865-4541-9171-6BAA57104CE4}" type="datetimeFigureOut">
               <a:rPr lang="fr-FR" smtClean="0"/>
-              <a:t>14/10/2025</a:t>
+              <a:t>15/10/2025</a:t>
             </a:fld>
             <a:endParaRPr lang="fr-FR"/>
           </a:p>
@@ -880,7 +880,7 @@
           <a:p>
             <a:fld id="{59020F72-C865-4541-9171-6BAA57104CE4}" type="datetimeFigureOut">
               <a:rPr lang="fr-FR" smtClean="0"/>
-              <a:t>14/10/2025</a:t>
+              <a:t>15/10/2025</a:t>
             </a:fld>
             <a:endParaRPr lang="fr-FR"/>
           </a:p>
@@ -1156,7 +1156,7 @@
           <a:p>
             <a:fld id="{59020F72-C865-4541-9171-6BAA57104CE4}" type="datetimeFigureOut">
               <a:rPr lang="fr-FR" smtClean="0"/>
-              <a:t>14/10/2025</a:t>
+              <a:t>15/10/2025</a:t>
             </a:fld>
             <a:endParaRPr lang="fr-FR"/>
           </a:p>
@@ -1424,7 +1424,7 @@
           <a:p>
             <a:fld id="{59020F72-C865-4541-9171-6BAA57104CE4}" type="datetimeFigureOut">
               <a:rPr lang="fr-FR" smtClean="0"/>
-              <a:t>14/10/2025</a:t>
+              <a:t>15/10/2025</a:t>
             </a:fld>
             <a:endParaRPr lang="fr-FR"/>
           </a:p>
@@ -1839,7 +1839,7 @@
           <a:p>
             <a:fld id="{59020F72-C865-4541-9171-6BAA57104CE4}" type="datetimeFigureOut">
               <a:rPr lang="fr-FR" smtClean="0"/>
-              <a:t>14/10/2025</a:t>
+              <a:t>15/10/2025</a:t>
             </a:fld>
             <a:endParaRPr lang="fr-FR"/>
           </a:p>
@@ -1981,7 +1981,7 @@
           <a:p>
             <a:fld id="{59020F72-C865-4541-9171-6BAA57104CE4}" type="datetimeFigureOut">
               <a:rPr lang="fr-FR" smtClean="0"/>
-              <a:t>14/10/2025</a:t>
+              <a:t>15/10/2025</a:t>
             </a:fld>
             <a:endParaRPr lang="fr-FR"/>
           </a:p>
@@ -2094,7 +2094,7 @@
           <a:p>
             <a:fld id="{59020F72-C865-4541-9171-6BAA57104CE4}" type="datetimeFigureOut">
               <a:rPr lang="fr-FR" smtClean="0"/>
-              <a:t>14/10/2025</a:t>
+              <a:t>15/10/2025</a:t>
             </a:fld>
             <a:endParaRPr lang="fr-FR"/>
           </a:p>
@@ -2407,7 +2407,7 @@
           <a:p>
             <a:fld id="{59020F72-C865-4541-9171-6BAA57104CE4}" type="datetimeFigureOut">
               <a:rPr lang="fr-FR" smtClean="0"/>
-              <a:t>14/10/2025</a:t>
+              <a:t>15/10/2025</a:t>
             </a:fld>
             <a:endParaRPr lang="fr-FR"/>
           </a:p>
@@ -2696,7 +2696,7 @@
           <a:p>
             <a:fld id="{59020F72-C865-4541-9171-6BAA57104CE4}" type="datetimeFigureOut">
               <a:rPr lang="fr-FR" smtClean="0"/>
-              <a:t>14/10/2025</a:t>
+              <a:t>15/10/2025</a:t>
             </a:fld>
             <a:endParaRPr lang="fr-FR"/>
           </a:p>
@@ -2939,7 +2939,7 @@
           <a:p>
             <a:fld id="{59020F72-C865-4541-9171-6BAA57104CE4}" type="datetimeFigureOut">
               <a:rPr lang="fr-FR" smtClean="0"/>
-              <a:t>14/10/2025</a:t>
+              <a:t>15/10/2025</a:t>
             </a:fld>
             <a:endParaRPr lang="fr-FR"/>
           </a:p>
@@ -5897,8 +5897,8 @@
           </p:graphicFrame>
         </mc:Fallback>
       </mc:AlternateContent>
-      <mc:AlternateContent xmlns:mc="http://schemas.openxmlformats.org/markup-compatibility/2006">
-        <mc:Choice xmlns:a14="http://schemas.microsoft.com/office/drawing/2010/main" Requires="a14">
+      <mc:AlternateContent xmlns:mc="http://schemas.openxmlformats.org/markup-compatibility/2006" xmlns:a14="http://schemas.microsoft.com/office/drawing/2010/main">
+        <mc:Choice Requires="a14">
           <p:sp>
             <p:nvSpPr>
               <p:cNvPr id="5" name="TextBox 4">
@@ -6710,7 +6710,7 @@
             </p:txBody>
           </p:sp>
         </mc:Choice>
-        <mc:Fallback>
+        <mc:Fallback xmlns="">
           <p:sp>
             <p:nvSpPr>
               <p:cNvPr id="5" name="TextBox 4">
@@ -6829,7 +6829,7 @@
           <a:p>
             <a:r>
               <a:rPr lang="fr-FR" dirty="0"/>
-              <a:t>dérivation numérique</a:t>
+              <a:t>Dérivation automatique</a:t>
             </a:r>
           </a:p>
         </p:txBody>
@@ -6855,7 +6855,7 @@
           </a:xfrm>
           <a:prstGeom prst="bentConnector3">
             <a:avLst>
-              <a:gd name="adj1" fmla="val 2174"/>
+              <a:gd name="adj1" fmla="val 50000"/>
             </a:avLst>
           </a:prstGeom>
           <a:ln>
@@ -9534,8 +9534,8 @@
           </a:p>
         </p:txBody>
       </p:sp>
-      <mc:AlternateContent xmlns:mc="http://schemas.openxmlformats.org/markup-compatibility/2006">
-        <mc:Choice xmlns:a14="http://schemas.microsoft.com/office/drawing/2010/main" Requires="a14">
+      <mc:AlternateContent xmlns:mc="http://schemas.openxmlformats.org/markup-compatibility/2006" xmlns:a14="http://schemas.microsoft.com/office/drawing/2010/main">
+        <mc:Choice Requires="a14">
           <p:sp>
             <p:nvSpPr>
               <p:cNvPr id="6" name="TextBox 5">
@@ -10166,7 +10166,7 @@
             </p:txBody>
           </p:sp>
         </mc:Choice>
-        <mc:Fallback>
+        <mc:Fallback xmlns="">
           <p:sp>
             <p:nvSpPr>
               <p:cNvPr id="6" name="TextBox 5">
@@ -10241,7 +10241,7 @@
           <a:p>
             <a:r>
               <a:rPr lang="fr-FR" dirty="0"/>
-              <a:t>dérivation numérique</a:t>
+              <a:t>dérivation automatique</a:t>
             </a:r>
           </a:p>
         </p:txBody>
@@ -10267,7 +10267,7 @@
           </a:xfrm>
           <a:prstGeom prst="bentConnector3">
             <a:avLst>
-              <a:gd name="adj1" fmla="val 2174"/>
+              <a:gd name="adj1" fmla="val 50000"/>
             </a:avLst>
           </a:prstGeom>
           <a:ln>

</xml_diff>